<commit_message>
cuando eres the listest y dejas el pie de pagina del blesa
</commit_message>
<xml_diff>
--- a/doc/Tomas/presentacion/Diseño e implementación de un servicio de acceso inalámbrico a dispositivos médicos mediante Heart-to-Heart.pptx
+++ b/doc/Tomas/presentacion/Diseño e implementación de un servicio de acceso inalámbrico a dispositivos médicos mediante Heart-to-Heart.pptx
@@ -5,10 +5,10 @@
     <p:sldMasterId id="2147483701" r:id="rId1"/>
   </p:sldMasterIdLst>
   <p:notesMasterIdLst>
-    <p:notesMasterId r:id="rId27"/>
+    <p:notesMasterId r:id="rId26"/>
   </p:notesMasterIdLst>
   <p:handoutMasterIdLst>
-    <p:handoutMasterId r:id="rId28"/>
+    <p:handoutMasterId r:id="rId27"/>
   </p:handoutMasterIdLst>
   <p:sldIdLst>
     <p:sldId id="256" r:id="rId2"/>
@@ -33,9 +33,8 @@
     <p:sldId id="353" r:id="rId21"/>
     <p:sldId id="334" r:id="rId22"/>
     <p:sldId id="354" r:id="rId23"/>
-    <p:sldId id="335" r:id="rId24"/>
-    <p:sldId id="355" r:id="rId25"/>
-    <p:sldId id="328" r:id="rId26"/>
+    <p:sldId id="355" r:id="rId24"/>
+    <p:sldId id="328" r:id="rId25"/>
   </p:sldIdLst>
   <p:sldSz cx="9144000" cy="6858000" type="screen4x3"/>
   <p:notesSz cx="6858000" cy="9144000"/>
@@ -205,7 +204,7 @@
             </a:lvl1pPr>
           </a:lstStyle>
           <a:p>
-            <a:endParaRPr lang="es-ES"/>
+            <a:endParaRPr lang="es-ES" dirty="0"/>
           </a:p>
         </p:txBody>
       </p:sp>
@@ -239,9 +238,9 @@
             <a:fld id="{C6F7FCB4-2EC9-4D4C-97B3-EE82AE5AF357}" type="datetimeFigureOut">
               <a:rPr lang="es-ES" smtClean="0"/>
               <a:pPr/>
-              <a:t>26/09/2016</a:t>
+              <a:t>27/09/2016</a:t>
             </a:fld>
-            <a:endParaRPr lang="es-ES"/>
+            <a:endParaRPr lang="es-ES" dirty="0"/>
           </a:p>
         </p:txBody>
       </p:sp>
@@ -272,7 +271,7 @@
             </a:lvl1pPr>
           </a:lstStyle>
           <a:p>
-            <a:endParaRPr lang="es-ES"/>
+            <a:endParaRPr lang="es-ES" dirty="0"/>
           </a:p>
         </p:txBody>
       </p:sp>
@@ -308,7 +307,7 @@
               <a:pPr/>
               <a:t>‹Nº›</a:t>
             </a:fld>
-            <a:endParaRPr lang="es-ES"/>
+            <a:endParaRPr lang="es-ES" dirty="0"/>
           </a:p>
         </p:txBody>
       </p:sp>
@@ -372,7 +371,7 @@
             </a:lvl1pPr>
           </a:lstStyle>
           <a:p>
-            <a:endParaRPr lang="es-ES"/>
+            <a:endParaRPr lang="es-ES" dirty="0"/>
           </a:p>
         </p:txBody>
       </p:sp>
@@ -406,9 +405,9 @@
             <a:fld id="{1C068B7F-3E46-4F22-A22A-F05B1622923D}" type="datetimeFigureOut">
               <a:rPr lang="es-ES" smtClean="0"/>
               <a:pPr/>
-              <a:t>26/09/2016</a:t>
+              <a:t>27/09/2016</a:t>
             </a:fld>
-            <a:endParaRPr lang="es-ES"/>
+            <a:endParaRPr lang="es-ES" dirty="0"/>
           </a:p>
         </p:txBody>
       </p:sp>
@@ -441,7 +440,7 @@
           <a:bodyPr vert="horz" lIns="91440" tIns="45720" rIns="91440" bIns="45720" rtlCol="0" anchor="ctr"/>
           <a:lstStyle/>
           <a:p>
-            <a:endParaRPr lang="es-ES"/>
+            <a:endParaRPr lang="es-ES" dirty="0"/>
           </a:p>
         </p:txBody>
       </p:sp>
@@ -532,7 +531,7 @@
             </a:lvl1pPr>
           </a:lstStyle>
           <a:p>
-            <a:endParaRPr lang="es-ES"/>
+            <a:endParaRPr lang="es-ES" dirty="0"/>
           </a:p>
         </p:txBody>
       </p:sp>
@@ -568,7 +567,7 @@
               <a:pPr/>
               <a:t>‹Nº›</a:t>
             </a:fld>
-            <a:endParaRPr lang="es-ES"/>
+            <a:endParaRPr lang="es-ES" dirty="0"/>
           </a:p>
         </p:txBody>
       </p:sp>
@@ -719,30 +718,6 @@
           <a:bodyPr/>
           <a:lstStyle/>
           <a:p>
-            <a:r>
-              <a:rPr lang="es-ES" dirty="0"/>
-              <a:t>Gracias por venir esta mañana. Mi nombre es Javier </a:t>
-            </a:r>
-            <a:r>
-              <a:rPr lang="es-ES" dirty="0" err="1"/>
-              <a:t>Blesa</a:t>
-            </a:r>
-            <a:r>
-              <a:rPr lang="es-ES" dirty="0"/>
-              <a:t> y voy a proceder</a:t>
-            </a:r>
-            <a:r>
-              <a:rPr lang="es-ES" baseline="0" dirty="0"/>
-              <a:t> a la defensa de mi tesis titulada ….</a:t>
-            </a:r>
-          </a:p>
-          <a:p>
-            <a:r>
-              <a:rPr lang="es-ES" baseline="0" dirty="0"/>
-              <a:t>Decir lo del idioma</a:t>
-            </a:r>
-          </a:p>
-          <a:p>
             <a:endParaRPr lang="es-ES" dirty="0"/>
           </a:p>
         </p:txBody>
@@ -767,7 +742,7 @@
               <a:pPr/>
               <a:t>1</a:t>
             </a:fld>
-            <a:endParaRPr lang="es-ES"/>
+            <a:endParaRPr lang="es-ES" dirty="0"/>
           </a:p>
         </p:txBody>
       </p:sp>
@@ -828,7 +803,7 @@
           <a:bodyPr/>
           <a:lstStyle/>
           <a:p>
-            <a:endParaRPr lang="es-ES"/>
+            <a:endParaRPr lang="es-ES" dirty="0"/>
           </a:p>
         </p:txBody>
       </p:sp>
@@ -852,7 +827,7 @@
               <a:pPr/>
               <a:t>14</a:t>
             </a:fld>
-            <a:endParaRPr lang="es-ES"/>
+            <a:endParaRPr lang="es-ES" dirty="0"/>
           </a:p>
         </p:txBody>
       </p:sp>
@@ -913,7 +888,7 @@
           <a:bodyPr/>
           <a:lstStyle/>
           <a:p>
-            <a:endParaRPr lang="es-ES"/>
+            <a:endParaRPr lang="es-ES" dirty="0"/>
           </a:p>
         </p:txBody>
       </p:sp>
@@ -937,7 +912,7 @@
               <a:pPr/>
               <a:t>19</a:t>
             </a:fld>
-            <a:endParaRPr lang="es-ES"/>
+            <a:endParaRPr lang="es-ES" dirty="0"/>
           </a:p>
         </p:txBody>
       </p:sp>
@@ -998,7 +973,7 @@
           <a:bodyPr/>
           <a:lstStyle/>
           <a:p>
-            <a:endParaRPr lang="es-ES"/>
+            <a:endParaRPr lang="es-ES" dirty="0"/>
           </a:p>
         </p:txBody>
       </p:sp>
@@ -1022,7 +997,7 @@
               <a:pPr/>
               <a:t>21</a:t>
             </a:fld>
-            <a:endParaRPr lang="es-ES"/>
+            <a:endParaRPr lang="es-ES" dirty="0"/>
           </a:p>
         </p:txBody>
       </p:sp>
@@ -1030,91 +1005,6 @@
     <p:extLst>
       <p:ext uri="{BB962C8B-B14F-4D97-AF65-F5344CB8AC3E}">
         <p14:creationId xmlns:p14="http://schemas.microsoft.com/office/powerpoint/2010/main" val="592227286"/>
-      </p:ext>
-    </p:extLst>
-  </p:cSld>
-  <p:clrMapOvr>
-    <a:masterClrMapping/>
-  </p:clrMapOvr>
-</p:notes>
-</file>
-
-<file path=ppt/notesSlides/notesSlide13.xml><?xml version="1.0" encoding="utf-8"?>
-<p:notes xmlns:a="http://schemas.openxmlformats.org/drawingml/2006/main" xmlns:r="http://schemas.openxmlformats.org/officeDocument/2006/relationships" xmlns:p="http://schemas.openxmlformats.org/presentationml/2006/main">
-  <p:cSld>
-    <p:spTree>
-      <p:nvGrpSpPr>
-        <p:cNvPr id="1" name=""/>
-        <p:cNvGrpSpPr/>
-        <p:nvPr/>
-      </p:nvGrpSpPr>
-      <p:grpSpPr>
-        <a:xfrm>
-          <a:off x="0" y="0"/>
-          <a:ext cx="0" cy="0"/>
-          <a:chOff x="0" y="0"/>
-          <a:chExt cx="0" cy="0"/>
-        </a:xfrm>
-      </p:grpSpPr>
-      <p:sp>
-        <p:nvSpPr>
-          <p:cNvPr id="2" name="Slide Image Placeholder 1"/>
-          <p:cNvSpPr>
-            <a:spLocks noGrp="1" noRot="1" noChangeAspect="1"/>
-          </p:cNvSpPr>
-          <p:nvPr>
-            <p:ph type="sldImg"/>
-          </p:nvPr>
-        </p:nvSpPr>
-        <p:spPr/>
-      </p:sp>
-      <p:sp>
-        <p:nvSpPr>
-          <p:cNvPr id="3" name="Notes Placeholder 2"/>
-          <p:cNvSpPr>
-            <a:spLocks noGrp="1"/>
-          </p:cNvSpPr>
-          <p:nvPr>
-            <p:ph type="body" idx="1"/>
-          </p:nvPr>
-        </p:nvSpPr>
-        <p:spPr/>
-        <p:txBody>
-          <a:bodyPr/>
-          <a:lstStyle/>
-          <a:p>
-            <a:endParaRPr lang="es-ES"/>
-          </a:p>
-        </p:txBody>
-      </p:sp>
-      <p:sp>
-        <p:nvSpPr>
-          <p:cNvPr id="4" name="Slide Number Placeholder 3"/>
-          <p:cNvSpPr>
-            <a:spLocks noGrp="1"/>
-          </p:cNvSpPr>
-          <p:nvPr>
-            <p:ph type="sldNum" sz="quarter" idx="10"/>
-          </p:nvPr>
-        </p:nvSpPr>
-        <p:spPr/>
-        <p:txBody>
-          <a:bodyPr/>
-          <a:lstStyle/>
-          <a:p>
-            <a:fld id="{D10DE9F6-E6D6-417B-B06D-C01696BDD228}" type="slidenum">
-              <a:rPr lang="es-ES" smtClean="0"/>
-              <a:pPr/>
-              <a:t>23</a:t>
-            </a:fld>
-            <a:endParaRPr lang="es-ES"/>
-          </a:p>
-        </p:txBody>
-      </p:sp>
-    </p:spTree>
-    <p:extLst>
-      <p:ext uri="{BB962C8B-B14F-4D97-AF65-F5344CB8AC3E}">
-        <p14:creationId xmlns:p14="http://schemas.microsoft.com/office/powerpoint/2010/main" val="1315651829"/>
       </p:ext>
     </p:extLst>
   </p:cSld>
@@ -1168,22 +1058,6 @@
           <a:bodyPr/>
           <a:lstStyle/>
           <a:p>
-            <a:r>
-              <a:rPr lang="es-ES" dirty="0"/>
-              <a:t>Este es el índice</a:t>
-            </a:r>
-            <a:r>
-              <a:rPr lang="es-ES" baseline="0" dirty="0"/>
-              <a:t> de la presentación. Comenzaremos con una introducción al marco que engloba esta tesis.  Pasaremos a comentar el trabajo relacionado existente hasta el día de hoy. Pasaremos a describir las estrategias de seguridad propuestas en esta tesis que son dos: la detección de anomalías contra PUE </a:t>
-            </a:r>
-            <a:r>
-              <a:rPr lang="es-ES" baseline="0" dirty="0" err="1"/>
-              <a:t>attack</a:t>
-            </a:r>
-            <a:r>
-              <a:rPr lang="es-ES" baseline="0" dirty="0"/>
-              <a:t> y la generación de ruido artificial contra ataques contra la privacidad. Seguiremos con la presentación de las herramientas creadas para este trabajo. Posteriormente mostraremos y analizaremos los resultados obtenidos en la tesis para acabar con las conclusiones y líneas futuras de trabajo.</a:t>
-            </a:r>
             <a:endParaRPr lang="es-ES" dirty="0"/>
           </a:p>
         </p:txBody>
@@ -1208,7 +1082,7 @@
               <a:pPr/>
               <a:t>2</a:t>
             </a:fld>
-            <a:endParaRPr lang="es-ES"/>
+            <a:endParaRPr lang="es-ES" dirty="0"/>
           </a:p>
         </p:txBody>
       </p:sp>
@@ -1269,7 +1143,7 @@
           <a:bodyPr/>
           <a:lstStyle/>
           <a:p>
-            <a:endParaRPr lang="es-ES"/>
+            <a:endParaRPr lang="es-ES" dirty="0"/>
           </a:p>
         </p:txBody>
       </p:sp>
@@ -1293,7 +1167,7 @@
               <a:pPr/>
               <a:t>3</a:t>
             </a:fld>
-            <a:endParaRPr lang="es-ES"/>
+            <a:endParaRPr lang="es-ES" dirty="0"/>
           </a:p>
         </p:txBody>
       </p:sp>
@@ -1400,7 +1274,7 @@
               <a:pPr/>
               <a:t>4</a:t>
             </a:fld>
-            <a:endParaRPr lang="es-ES"/>
+            <a:endParaRPr lang="es-ES" dirty="0"/>
           </a:p>
         </p:txBody>
       </p:sp>
@@ -1507,7 +1381,7 @@
               <a:pPr/>
               <a:t>5</a:t>
             </a:fld>
-            <a:endParaRPr lang="es-ES"/>
+            <a:endParaRPr lang="es-ES" dirty="0"/>
           </a:p>
         </p:txBody>
       </p:sp>
@@ -1568,7 +1442,7 @@
           <a:bodyPr/>
           <a:lstStyle/>
           <a:p>
-            <a:endParaRPr lang="es-ES"/>
+            <a:endParaRPr lang="es-ES" dirty="0"/>
           </a:p>
         </p:txBody>
       </p:sp>
@@ -1592,7 +1466,7 @@
               <a:pPr/>
               <a:t>6</a:t>
             </a:fld>
-            <a:endParaRPr lang="es-ES"/>
+            <a:endParaRPr lang="es-ES" dirty="0"/>
           </a:p>
         </p:txBody>
       </p:sp>
@@ -1653,7 +1527,7 @@
           <a:bodyPr/>
           <a:lstStyle/>
           <a:p>
-            <a:endParaRPr lang="es-ES"/>
+            <a:endParaRPr lang="es-ES" dirty="0"/>
           </a:p>
         </p:txBody>
       </p:sp>
@@ -1677,7 +1551,7 @@
               <a:pPr/>
               <a:t>7</a:t>
             </a:fld>
-            <a:endParaRPr lang="es-ES"/>
+            <a:endParaRPr lang="es-ES" dirty="0"/>
           </a:p>
         </p:txBody>
       </p:sp>
@@ -1784,7 +1658,7 @@
               <a:pPr/>
               <a:t>8</a:t>
             </a:fld>
-            <a:endParaRPr lang="es-ES"/>
+            <a:endParaRPr lang="es-ES" dirty="0"/>
           </a:p>
         </p:txBody>
       </p:sp>
@@ -1845,7 +1719,7 @@
           <a:bodyPr/>
           <a:lstStyle/>
           <a:p>
-            <a:endParaRPr lang="es-ES"/>
+            <a:endParaRPr lang="es-ES" dirty="0"/>
           </a:p>
         </p:txBody>
       </p:sp>
@@ -1869,7 +1743,7 @@
               <a:pPr/>
               <a:t>9</a:t>
             </a:fld>
-            <a:endParaRPr lang="es-ES"/>
+            <a:endParaRPr lang="es-ES" dirty="0"/>
           </a:p>
         </p:txBody>
       </p:sp>
@@ -2046,9 +1920,9 @@
             <a:fld id="{6ECB203F-7230-4BE6-B59F-FE5371E612CA}" type="datetime1">
               <a:rPr lang="es-ES" smtClean="0"/>
               <a:pPr/>
-              <a:t>26/09/2016</a:t>
+              <a:t>27/09/2016</a:t>
             </a:fld>
-            <a:endParaRPr lang="es-ES"/>
+            <a:endParaRPr lang="es-ES" dirty="0"/>
           </a:p>
         </p:txBody>
       </p:sp>
@@ -2068,10 +1942,10 @@
           <a:lstStyle/>
           <a:p>
             <a:r>
-              <a:rPr lang="en-US"/>
+              <a:rPr lang="en-US" dirty="0"/>
               <a:t>Cognitive based strategies for security in Wireless Sensor Networks</a:t>
             </a:r>
-            <a:endParaRPr lang="es-ES"/>
+            <a:endParaRPr lang="es-ES" dirty="0"/>
           </a:p>
         </p:txBody>
       </p:sp>
@@ -2095,7 +1969,7 @@
               <a:pPr/>
               <a:t>‹Nº›</a:t>
             </a:fld>
-            <a:endParaRPr lang="es-ES"/>
+            <a:endParaRPr lang="es-ES" dirty="0"/>
           </a:p>
         </p:txBody>
       </p:sp>
@@ -2214,9 +2088,9 @@
             <a:fld id="{97D3093F-3E3F-4E6A-A66D-9B7B6556EA23}" type="datetime1">
               <a:rPr lang="es-ES" smtClean="0"/>
               <a:pPr/>
-              <a:t>26/09/2016</a:t>
+              <a:t>27/09/2016</a:t>
             </a:fld>
-            <a:endParaRPr lang="es-ES"/>
+            <a:endParaRPr lang="es-ES" dirty="0"/>
           </a:p>
         </p:txBody>
       </p:sp>
@@ -2236,10 +2110,10 @@
           <a:lstStyle/>
           <a:p>
             <a:r>
-              <a:rPr lang="en-US"/>
+              <a:rPr lang="en-US" dirty="0"/>
               <a:t>Cognitive based strategies for security in Wireless Sensor Networks</a:t>
             </a:r>
-            <a:endParaRPr lang="es-ES"/>
+            <a:endParaRPr lang="es-ES" dirty="0"/>
           </a:p>
         </p:txBody>
       </p:sp>
@@ -2263,7 +2137,7 @@
               <a:pPr/>
               <a:t>‹Nº›</a:t>
             </a:fld>
-            <a:endParaRPr lang="es-ES"/>
+            <a:endParaRPr lang="es-ES" dirty="0"/>
           </a:p>
         </p:txBody>
       </p:sp>
@@ -2721,9 +2595,9 @@
             <a:fld id="{CFECB3CC-ABFF-417F-95A5-A02D7CEC9B18}" type="datetime1">
               <a:rPr lang="es-ES" smtClean="0"/>
               <a:pPr/>
-              <a:t>26/09/2016</a:t>
+              <a:t>27/09/2016</a:t>
             </a:fld>
-            <a:endParaRPr lang="es-ES"/>
+            <a:endParaRPr lang="es-ES" dirty="0"/>
           </a:p>
         </p:txBody>
       </p:sp>
@@ -2743,10 +2617,10 @@
           <a:lstStyle/>
           <a:p>
             <a:r>
-              <a:rPr lang="en-US"/>
+              <a:rPr lang="en-US" dirty="0"/>
               <a:t>Cognitive based strategies for security in Wireless Sensor Networks</a:t>
             </a:r>
-            <a:endParaRPr lang="es-ES"/>
+            <a:endParaRPr lang="es-ES" dirty="0"/>
           </a:p>
         </p:txBody>
       </p:sp>
@@ -2770,7 +2644,7 @@
               <a:pPr/>
               <a:t>‹Nº›</a:t>
             </a:fld>
-            <a:endParaRPr lang="es-ES"/>
+            <a:endParaRPr lang="es-ES" dirty="0"/>
           </a:p>
         </p:txBody>
       </p:sp>
@@ -2893,7 +2767,7 @@
           </a:lstStyle>
           <a:p>
             <a:r>
-              <a:rPr lang="es-ES"/>
+              <a:rPr lang="es-ES" dirty="0"/>
               <a:t>Haga clic en el icono para agregar una imagen</a:t>
             </a:r>
           </a:p>
@@ -2982,9 +2856,9 @@
             <a:fld id="{0CCD06B5-A713-4A61-B22F-FE52D274561D}" type="datetime1">
               <a:rPr lang="es-ES" smtClean="0"/>
               <a:pPr/>
-              <a:t>26/09/2016</a:t>
+              <a:t>27/09/2016</a:t>
             </a:fld>
-            <a:endParaRPr lang="es-ES"/>
+            <a:endParaRPr lang="es-ES" dirty="0"/>
           </a:p>
         </p:txBody>
       </p:sp>
@@ -3004,10 +2878,10 @@
           <a:lstStyle/>
           <a:p>
             <a:r>
-              <a:rPr lang="en-US"/>
+              <a:rPr lang="en-US" dirty="0"/>
               <a:t>Cognitive based strategies for security in Wireless Sensor Networks</a:t>
             </a:r>
-            <a:endParaRPr lang="es-ES"/>
+            <a:endParaRPr lang="es-ES" dirty="0"/>
           </a:p>
         </p:txBody>
       </p:sp>
@@ -3031,7 +2905,7 @@
               <a:pPr/>
               <a:t>‹Nº›</a:t>
             </a:fld>
-            <a:endParaRPr lang="es-ES"/>
+            <a:endParaRPr lang="es-ES" dirty="0"/>
           </a:p>
         </p:txBody>
       </p:sp>
@@ -3156,9 +3030,9 @@
             <a:fld id="{E0219C4C-4886-4C02-93E0-69E36226A09B}" type="datetime1">
               <a:rPr lang="es-ES" smtClean="0"/>
               <a:pPr/>
-              <a:t>26/09/2016</a:t>
+              <a:t>27/09/2016</a:t>
             </a:fld>
-            <a:endParaRPr lang="es-ES"/>
+            <a:endParaRPr lang="es-ES" dirty="0"/>
           </a:p>
         </p:txBody>
       </p:sp>
@@ -3178,10 +3052,10 @@
           <a:lstStyle/>
           <a:p>
             <a:r>
-              <a:rPr lang="en-US"/>
+              <a:rPr lang="en-US" dirty="0"/>
               <a:t>Cognitive based strategies for security in Wireless Sensor Networks</a:t>
             </a:r>
-            <a:endParaRPr lang="es-ES"/>
+            <a:endParaRPr lang="es-ES" dirty="0"/>
           </a:p>
         </p:txBody>
       </p:sp>
@@ -3205,7 +3079,7 @@
               <a:pPr/>
               <a:t>‹Nº›</a:t>
             </a:fld>
-            <a:endParaRPr lang="es-ES"/>
+            <a:endParaRPr lang="es-ES" dirty="0"/>
           </a:p>
         </p:txBody>
       </p:sp>
@@ -3340,9 +3214,9 @@
             <a:fld id="{17D71AB6-9224-4C5E-84E9-78A86C37A06C}" type="datetime1">
               <a:rPr lang="es-ES" smtClean="0"/>
               <a:pPr/>
-              <a:t>26/09/2016</a:t>
+              <a:t>27/09/2016</a:t>
             </a:fld>
-            <a:endParaRPr lang="es-ES"/>
+            <a:endParaRPr lang="es-ES" dirty="0"/>
           </a:p>
         </p:txBody>
       </p:sp>
@@ -3362,10 +3236,10 @@
           <a:lstStyle/>
           <a:p>
             <a:r>
-              <a:rPr lang="en-US"/>
+              <a:rPr lang="en-US" dirty="0"/>
               <a:t>Cognitive based strategies for security in Wireless Sensor Networks</a:t>
             </a:r>
-            <a:endParaRPr lang="es-ES"/>
+            <a:endParaRPr lang="es-ES" dirty="0"/>
           </a:p>
         </p:txBody>
       </p:sp>
@@ -3389,7 +3263,7 @@
               <a:pPr/>
               <a:t>‹Nº›</a:t>
             </a:fld>
-            <a:endParaRPr lang="es-ES"/>
+            <a:endParaRPr lang="es-ES" dirty="0"/>
           </a:p>
         </p:txBody>
       </p:sp>
@@ -3566,9 +3440,9 @@
             <a:fld id="{D968C3E1-7678-4F14-B5DF-DE5A15A6A94E}" type="datetime1">
               <a:rPr lang="es-ES" smtClean="0"/>
               <a:pPr/>
-              <a:t>26/09/2016</a:t>
+              <a:t>27/09/2016</a:t>
             </a:fld>
-            <a:endParaRPr lang="es-ES"/>
+            <a:endParaRPr lang="es-ES" dirty="0"/>
           </a:p>
         </p:txBody>
       </p:sp>
@@ -3588,10 +3462,10 @@
           <a:lstStyle/>
           <a:p>
             <a:r>
-              <a:rPr lang="en-US"/>
+              <a:rPr lang="en-US" dirty="0"/>
               <a:t>Cognitive based strategies for security in Wireless Sensor Networks</a:t>
             </a:r>
-            <a:endParaRPr lang="es-ES"/>
+            <a:endParaRPr lang="es-ES" dirty="0"/>
           </a:p>
         </p:txBody>
       </p:sp>
@@ -3615,7 +3489,7 @@
               <a:pPr/>
               <a:t>‹Nº›</a:t>
             </a:fld>
-            <a:endParaRPr lang="es-ES"/>
+            <a:endParaRPr lang="es-ES" dirty="0"/>
           </a:p>
         </p:txBody>
       </p:sp>
@@ -3753,7 +3627,7 @@
             <a:lstStyle/>
             <a:p>
               <a:pPr algn="ctr"/>
-              <a:endParaRPr lang="es-ES"/>
+              <a:endParaRPr lang="es-ES" dirty="0"/>
             </a:p>
           </p:txBody>
         </p:sp>
@@ -3842,9 +3716,9 @@
             <a:fld id="{E984CA23-7F82-40B8-B386-A40325CBC743}" type="datetime1">
               <a:rPr lang="es-ES" smtClean="0"/>
               <a:pPr/>
-              <a:t>26/09/2016</a:t>
+              <a:t>27/09/2016</a:t>
             </a:fld>
-            <a:endParaRPr lang="es-ES"/>
+            <a:endParaRPr lang="es-ES" dirty="0"/>
           </a:p>
         </p:txBody>
       </p:sp>
@@ -3864,10 +3738,10 @@
           <a:lstStyle/>
           <a:p>
             <a:r>
-              <a:rPr lang="en-US"/>
+              <a:rPr lang="en-US" dirty="0"/>
               <a:t>Cognitive based strategies for security in Wireless Sensor Networks</a:t>
             </a:r>
-            <a:endParaRPr lang="es-ES"/>
+            <a:endParaRPr lang="es-ES" dirty="0"/>
           </a:p>
         </p:txBody>
       </p:sp>
@@ -3891,7 +3765,7 @@
               <a:pPr/>
               <a:t>‹Nº›</a:t>
             </a:fld>
-            <a:endParaRPr lang="es-ES"/>
+            <a:endParaRPr lang="es-ES" dirty="0"/>
           </a:p>
         </p:txBody>
       </p:sp>
@@ -3965,9 +3839,9 @@
             <a:fld id="{AB46239A-F3CE-4DED-B15C-0CC21F16BC0D}" type="datetime1">
               <a:rPr lang="es-ES" smtClean="0"/>
               <a:pPr/>
-              <a:t>26/09/2016</a:t>
+              <a:t>27/09/2016</a:t>
             </a:fld>
-            <a:endParaRPr lang="es-ES"/>
+            <a:endParaRPr lang="es-ES" dirty="0"/>
           </a:p>
         </p:txBody>
       </p:sp>
@@ -3987,10 +3861,10 @@
           <a:lstStyle/>
           <a:p>
             <a:r>
-              <a:rPr lang="en-US"/>
+              <a:rPr lang="en-US" dirty="0"/>
               <a:t>Cognitive based strategies for security in Wireless Sensor Networks</a:t>
             </a:r>
-            <a:endParaRPr lang="es-ES"/>
+            <a:endParaRPr lang="es-ES" dirty="0"/>
           </a:p>
         </p:txBody>
       </p:sp>
@@ -4014,7 +3888,7 @@
               <a:pPr/>
               <a:t>‹Nº›</a:t>
             </a:fld>
-            <a:endParaRPr lang="es-ES"/>
+            <a:endParaRPr lang="es-ES" dirty="0"/>
           </a:p>
         </p:txBody>
       </p:sp>
@@ -4206,9 +4080,9 @@
             <a:fld id="{97D3093F-3E3F-4E6A-A66D-9B7B6556EA23}" type="datetime1">
               <a:rPr lang="es-ES" smtClean="0"/>
               <a:pPr/>
-              <a:t>26/09/2016</a:t>
+              <a:t>27/09/2016</a:t>
             </a:fld>
-            <a:endParaRPr lang="es-ES"/>
+            <a:endParaRPr lang="es-ES" dirty="0"/>
           </a:p>
         </p:txBody>
       </p:sp>
@@ -4228,10 +4102,10 @@
           <a:lstStyle/>
           <a:p>
             <a:r>
-              <a:rPr lang="en-US"/>
+              <a:rPr lang="en-US" dirty="0"/>
               <a:t>Cognitive based strategies for security in Wireless Sensor Networks</a:t>
             </a:r>
-            <a:endParaRPr lang="es-ES"/>
+            <a:endParaRPr lang="es-ES" dirty="0"/>
           </a:p>
         </p:txBody>
       </p:sp>
@@ -4255,7 +4129,7 @@
               <a:pPr/>
               <a:t>‹Nº›</a:t>
             </a:fld>
-            <a:endParaRPr lang="es-ES"/>
+            <a:endParaRPr lang="es-ES" dirty="0"/>
           </a:p>
         </p:txBody>
       </p:sp>
@@ -4574,7 +4448,7 @@
             <a:fld id="{5900E160-C635-4648-8A55-1D51BDEFBB2B}" type="datetime1">
               <a:rPr lang="es-ES" smtClean="0"/>
               <a:pPr/>
-              <a:t>26/09/2016</a:t>
+              <a:t>27/09/2016</a:t>
             </a:fld>
             <a:endParaRPr lang="es-ES" dirty="0"/>
           </a:p>
@@ -4601,7 +4475,7 @@
           <a:lstStyle/>
           <a:p>
             <a:r>
-              <a:rPr lang="en-US"/>
+              <a:rPr lang="en-US" dirty="0"/>
               <a:t>Cognitive based strategies for security in Wireless Sensor Networks</a:t>
             </a:r>
             <a:endParaRPr lang="es-ES" dirty="0"/>
@@ -4628,7 +4502,7 @@
               <a:pPr/>
               <a:t>‹Nº›</a:t>
             </a:fld>
-            <a:endParaRPr lang="es-ES"/>
+            <a:endParaRPr lang="es-ES" dirty="0"/>
           </a:p>
         </p:txBody>
       </p:sp>
@@ -4711,9 +4585,9 @@
             <a:fld id="{E86A4EED-3D9D-465E-B4A8-B7C043A14788}" type="datetime1">
               <a:rPr lang="es-ES" smtClean="0"/>
               <a:pPr/>
-              <a:t>26/09/2016</a:t>
+              <a:t>27/09/2016</a:t>
             </a:fld>
-            <a:endParaRPr lang="es-ES"/>
+            <a:endParaRPr lang="es-ES" dirty="0"/>
           </a:p>
         </p:txBody>
       </p:sp>
@@ -4733,10 +4607,10 @@
           <a:lstStyle/>
           <a:p>
             <a:r>
-              <a:rPr lang="en-US"/>
+              <a:rPr lang="en-US" dirty="0"/>
               <a:t>Cognitive based strategies for security in Wireless Sensor Networks</a:t>
             </a:r>
-            <a:endParaRPr lang="es-ES"/>
+            <a:endParaRPr lang="es-ES" dirty="0"/>
           </a:p>
         </p:txBody>
       </p:sp>
@@ -4760,7 +4634,7 @@
               <a:pPr/>
               <a:t>‹Nº›</a:t>
             </a:fld>
-            <a:endParaRPr lang="es-ES"/>
+            <a:endParaRPr lang="es-ES" dirty="0"/>
           </a:p>
         </p:txBody>
       </p:sp>
@@ -4843,7 +4717,7 @@
           <a:lstStyle/>
           <a:p>
             <a:pPr algn="ctr"/>
-            <a:endParaRPr lang="es-ES"/>
+            <a:endParaRPr lang="es-ES" dirty="0"/>
           </a:p>
         </p:txBody>
       </p:sp>
@@ -4990,7 +4864,7 @@
           <a:lstStyle/>
           <a:p>
             <a:pPr algn="ctr"/>
-            <a:endParaRPr lang="es-ES"/>
+            <a:endParaRPr lang="es-ES" dirty="0"/>
           </a:p>
         </p:txBody>
       </p:sp>
@@ -5071,7 +4945,7 @@
           <a:lstStyle/>
           <a:p>
             <a:pPr algn="ctr"/>
-            <a:endParaRPr lang="es-ES"/>
+            <a:endParaRPr lang="es-ES" dirty="0"/>
           </a:p>
         </p:txBody>
       </p:sp>
@@ -5154,9 +5028,9 @@
             <a:fld id="{AB3C7C33-3BD3-4B60-99CA-2C0DDC1897F8}" type="datetime1">
               <a:rPr lang="es-ES" smtClean="0"/>
               <a:pPr/>
-              <a:t>26/09/2016</a:t>
+              <a:t>27/09/2016</a:t>
             </a:fld>
-            <a:endParaRPr lang="es-ES"/>
+            <a:endParaRPr lang="es-ES" dirty="0"/>
           </a:p>
         </p:txBody>
       </p:sp>
@@ -5176,10 +5050,10 @@
           <a:lstStyle/>
           <a:p>
             <a:r>
-              <a:rPr lang="en-US"/>
+              <a:rPr lang="en-US" dirty="0"/>
               <a:t>Cognitive based strategies for security in Wireless Sensor Networks</a:t>
             </a:r>
-            <a:endParaRPr lang="es-ES"/>
+            <a:endParaRPr lang="es-ES" dirty="0"/>
           </a:p>
         </p:txBody>
       </p:sp>
@@ -5203,7 +5077,7 @@
               <a:pPr/>
               <a:t>‹Nº›</a:t>
             </a:fld>
-            <a:endParaRPr lang="es-ES"/>
+            <a:endParaRPr lang="es-ES" dirty="0"/>
           </a:p>
         </p:txBody>
       </p:sp>
@@ -5228,10 +5102,9 @@
           <a:lstStyle/>
           <a:p>
             <a:r>
-              <a:rPr lang="es-ES"/>
+              <a:rPr lang="es-ES" dirty="0"/>
               <a:t>Haga clic en el icono para agregar un gráfico</a:t>
             </a:r>
-            <a:endParaRPr lang="es-ES" dirty="0"/>
           </a:p>
         </p:txBody>
       </p:sp>
@@ -5277,7 +5150,7 @@
           <a:lstStyle/>
           <a:p>
             <a:pPr algn="ctr"/>
-            <a:endParaRPr lang="es-ES"/>
+            <a:endParaRPr lang="es-ES" dirty="0"/>
           </a:p>
         </p:txBody>
       </p:sp>
@@ -5437,9 +5310,9 @@
             <a:fld id="{1F6419E6-2D40-430C-80BC-095CD6734C00}" type="datetime1">
               <a:rPr lang="es-ES" smtClean="0"/>
               <a:pPr/>
-              <a:t>26/09/2016</a:t>
+              <a:t>27/09/2016</a:t>
             </a:fld>
-            <a:endParaRPr lang="es-ES"/>
+            <a:endParaRPr lang="es-ES" dirty="0"/>
           </a:p>
         </p:txBody>
       </p:sp>
@@ -5459,10 +5332,10 @@
           <a:lstStyle/>
           <a:p>
             <a:r>
-              <a:rPr lang="en-US"/>
+              <a:rPr lang="en-US" dirty="0"/>
               <a:t>Cognitive based strategies for security in Wireless Sensor Networks</a:t>
             </a:r>
-            <a:endParaRPr lang="es-ES"/>
+            <a:endParaRPr lang="es-ES" dirty="0"/>
           </a:p>
         </p:txBody>
       </p:sp>
@@ -5486,7 +5359,7 @@
               <a:pPr/>
               <a:t>‹Nº›</a:t>
             </a:fld>
-            <a:endParaRPr lang="es-ES"/>
+            <a:endParaRPr lang="es-ES" dirty="0"/>
           </a:p>
         </p:txBody>
       </p:sp>
@@ -5624,9 +5497,9 @@
             <a:fld id="{51AD4A2B-43D8-42D4-921F-CEC9421467EC}" type="datetime1">
               <a:rPr lang="es-ES" smtClean="0"/>
               <a:pPr/>
-              <a:t>26/09/2016</a:t>
+              <a:t>27/09/2016</a:t>
             </a:fld>
-            <a:endParaRPr lang="es-ES"/>
+            <a:endParaRPr lang="es-ES" dirty="0"/>
           </a:p>
         </p:txBody>
       </p:sp>
@@ -5651,10 +5524,10 @@
           <a:lstStyle/>
           <a:p>
             <a:r>
-              <a:rPr lang="en-US"/>
+              <a:rPr lang="en-US" dirty="0"/>
               <a:t>Cognitive based strategies for security in Wireless Sensor Networks</a:t>
             </a:r>
-            <a:endParaRPr lang="es-ES"/>
+            <a:endParaRPr lang="es-ES" dirty="0"/>
           </a:p>
         </p:txBody>
       </p:sp>
@@ -5678,7 +5551,7 @@
               <a:pPr/>
               <a:t>‹Nº›</a:t>
             </a:fld>
-            <a:endParaRPr lang="es-ES"/>
+            <a:endParaRPr lang="es-ES" dirty="0"/>
           </a:p>
         </p:txBody>
       </p:sp>
@@ -5730,9 +5603,9 @@
             <a:fld id="{79553024-CA05-4324-8900-401E51F3F37B}" type="datetime1">
               <a:rPr lang="es-ES" smtClean="0"/>
               <a:pPr/>
-              <a:t>26/09/2016</a:t>
+              <a:t>27/09/2016</a:t>
             </a:fld>
-            <a:endParaRPr lang="es-ES"/>
+            <a:endParaRPr lang="es-ES" dirty="0"/>
           </a:p>
         </p:txBody>
       </p:sp>
@@ -5752,10 +5625,10 @@
           <a:lstStyle/>
           <a:p>
             <a:r>
-              <a:rPr lang="en-US"/>
+              <a:rPr lang="en-US" dirty="0"/>
               <a:t>Cognitive based strategies for security in Wireless Sensor Networks</a:t>
             </a:r>
-            <a:endParaRPr lang="es-ES"/>
+            <a:endParaRPr lang="es-ES" dirty="0"/>
           </a:p>
         </p:txBody>
       </p:sp>
@@ -5779,7 +5652,7 @@
               <a:pPr/>
               <a:t>‹Nº›</a:t>
             </a:fld>
-            <a:endParaRPr lang="es-ES"/>
+            <a:endParaRPr lang="es-ES" dirty="0"/>
           </a:p>
         </p:txBody>
       </p:sp>
@@ -5853,9 +5726,9 @@
             <a:fld id="{AB46239A-F3CE-4DED-B15C-0CC21F16BC0D}" type="datetime1">
               <a:rPr lang="es-ES" smtClean="0"/>
               <a:pPr/>
-              <a:t>26/09/2016</a:t>
+              <a:t>27/09/2016</a:t>
             </a:fld>
-            <a:endParaRPr lang="es-ES"/>
+            <a:endParaRPr lang="es-ES" dirty="0"/>
           </a:p>
         </p:txBody>
       </p:sp>
@@ -5875,10 +5748,10 @@
           <a:lstStyle/>
           <a:p>
             <a:r>
-              <a:rPr lang="en-US"/>
+              <a:rPr lang="en-US" dirty="0"/>
               <a:t>Cognitive based strategies for security in Wireless Sensor Networks</a:t>
             </a:r>
-            <a:endParaRPr lang="es-ES"/>
+            <a:endParaRPr lang="es-ES" dirty="0"/>
           </a:p>
         </p:txBody>
       </p:sp>
@@ -5902,7 +5775,7 @@
               <a:pPr/>
               <a:t>‹Nº›</a:t>
             </a:fld>
-            <a:endParaRPr lang="es-ES"/>
+            <a:endParaRPr lang="es-ES" dirty="0"/>
           </a:p>
         </p:txBody>
       </p:sp>
@@ -6090,9 +5963,9 @@
             <a:fld id="{89ED8384-F249-4029-B08D-F6E33C1A6B1D}" type="datetime1">
               <a:rPr lang="es-ES" smtClean="0"/>
               <a:pPr/>
-              <a:t>26/09/2016</a:t>
+              <a:t>27/09/2016</a:t>
             </a:fld>
-            <a:endParaRPr lang="es-ES"/>
+            <a:endParaRPr lang="es-ES" dirty="0"/>
           </a:p>
         </p:txBody>
       </p:sp>
@@ -6112,10 +5985,10 @@
           <a:lstStyle/>
           <a:p>
             <a:r>
-              <a:rPr lang="en-US"/>
+              <a:rPr lang="en-US" dirty="0"/>
               <a:t>Cognitive based strategies for security in Wireless Sensor Networks</a:t>
             </a:r>
-            <a:endParaRPr lang="es-ES"/>
+            <a:endParaRPr lang="es-ES" dirty="0"/>
           </a:p>
         </p:txBody>
       </p:sp>
@@ -6139,7 +6012,7 @@
               <a:pPr/>
               <a:t>‹Nº›</a:t>
             </a:fld>
-            <a:endParaRPr lang="es-ES"/>
+            <a:endParaRPr lang="es-ES" dirty="0"/>
           </a:p>
         </p:txBody>
       </p:sp>
@@ -6419,9 +6292,9 @@
             <a:fld id="{89ED8384-F249-4029-B08D-F6E33C1A6B1D}" type="datetime1">
               <a:rPr lang="es-ES" smtClean="0"/>
               <a:pPr/>
-              <a:t>26/09/2016</a:t>
+              <a:t>27/09/2016</a:t>
             </a:fld>
-            <a:endParaRPr lang="es-ES"/>
+            <a:endParaRPr lang="es-ES" dirty="0"/>
           </a:p>
         </p:txBody>
       </p:sp>
@@ -6460,10 +6333,10 @@
           </a:lstStyle>
           <a:p>
             <a:r>
-              <a:rPr lang="en-US"/>
+              <a:rPr lang="en-US" dirty="0"/>
               <a:t>Cognitive based strategies for security in Wireless Sensor Networks</a:t>
             </a:r>
-            <a:endParaRPr lang="es-ES"/>
+            <a:endParaRPr lang="es-ES" dirty="0"/>
           </a:p>
         </p:txBody>
       </p:sp>
@@ -6505,7 +6378,7 @@
               <a:pPr/>
               <a:t>‹Nº›</a:t>
             </a:fld>
-            <a:endParaRPr lang="es-ES"/>
+            <a:endParaRPr lang="es-ES" dirty="0"/>
           </a:p>
         </p:txBody>
       </p:sp>
@@ -6591,7 +6464,7 @@
           <a:lstStyle/>
           <a:p>
             <a:pPr algn="ctr"/>
-            <a:endParaRPr lang="es-ES"/>
+            <a:endParaRPr lang="es-ES" dirty="0"/>
           </a:p>
         </p:txBody>
       </p:sp>
@@ -7026,9 +6899,9 @@
             <a:fld id="{3E906B9C-6641-4599-8FB4-B5DEEDDA1170}" type="datetime1">
               <a:rPr lang="es-ES" smtClean="0"/>
               <a:pPr/>
-              <a:t>26/09/2016</a:t>
+              <a:t>27/09/2016</a:t>
             </a:fld>
-            <a:endParaRPr lang="es-ES"/>
+            <a:endParaRPr lang="es-ES" dirty="0"/>
           </a:p>
         </p:txBody>
       </p:sp>
@@ -7074,7 +6947,7 @@
               <a:pPr/>
               <a:t>1</a:t>
             </a:fld>
-            <a:endParaRPr lang="es-ES"/>
+            <a:endParaRPr lang="es-ES" dirty="0"/>
           </a:p>
         </p:txBody>
       </p:sp>
@@ -7240,9 +7113,9 @@
             <a:fld id="{51AD4A2B-43D8-42D4-921F-CEC9421467EC}" type="datetime1">
               <a:rPr lang="es-ES" smtClean="0"/>
               <a:pPr/>
-              <a:t>26/09/2016</a:t>
+              <a:t>27/09/2016</a:t>
             </a:fld>
-            <a:endParaRPr lang="es-ES"/>
+            <a:endParaRPr lang="es-ES" dirty="0"/>
           </a:p>
         </p:txBody>
       </p:sp>
@@ -7256,16 +7129,20 @@
             <p:ph type="ftr" sz="quarter" idx="11"/>
           </p:nvPr>
         </p:nvSpPr>
-        <p:spPr/>
-        <p:txBody>
-          <a:bodyPr/>
-          <a:lstStyle/>
-          <a:p>
-            <a:r>
-              <a:rPr lang="en-US"/>
-              <a:t>Cognitive based strategies for security in Wireless Sensor Networks</a:t>
-            </a:r>
-            <a:endParaRPr lang="es-ES"/>
+        <p:spPr>
+          <a:xfrm>
+            <a:off x="2818701" y="6492875"/>
+            <a:ext cx="5825265" cy="365125"/>
+          </a:xfrm>
+        </p:spPr>
+        <p:txBody>
+          <a:bodyPr/>
+          <a:lstStyle/>
+          <a:p>
+            <a:r>
+              <a:rPr lang="es-ES" dirty="0"/>
+              <a:t>Diseño e implementación de un servicio de acceso inalámbrico a dispositivos médicos mediante Heart-to-Heart</a:t>
+            </a:r>
           </a:p>
         </p:txBody>
       </p:sp>
@@ -7289,7 +7166,7 @@
               <a:pPr/>
               <a:t>10</a:t>
             </a:fld>
-            <a:endParaRPr lang="es-ES"/>
+            <a:endParaRPr lang="es-ES" dirty="0"/>
           </a:p>
         </p:txBody>
       </p:sp>
@@ -7494,9 +7371,9 @@
             <a:fld id="{51AD4A2B-43D8-42D4-921F-CEC9421467EC}" type="datetime1">
               <a:rPr lang="es-ES" smtClean="0"/>
               <a:pPr/>
-              <a:t>26/09/2016</a:t>
+              <a:t>27/09/2016</a:t>
             </a:fld>
-            <a:endParaRPr lang="es-ES"/>
+            <a:endParaRPr lang="es-ES" dirty="0"/>
           </a:p>
         </p:txBody>
       </p:sp>
@@ -7510,16 +7387,20 @@
             <p:ph type="ftr" sz="quarter" idx="11"/>
           </p:nvPr>
         </p:nvSpPr>
-        <p:spPr/>
-        <p:txBody>
-          <a:bodyPr/>
-          <a:lstStyle/>
-          <a:p>
-            <a:r>
-              <a:rPr lang="en-US"/>
-              <a:t>Cognitive based strategies for security in Wireless Sensor Networks</a:t>
-            </a:r>
-            <a:endParaRPr lang="es-ES"/>
+        <p:spPr>
+          <a:xfrm>
+            <a:off x="2827090" y="6492875"/>
+            <a:ext cx="5816876" cy="365125"/>
+          </a:xfrm>
+        </p:spPr>
+        <p:txBody>
+          <a:bodyPr/>
+          <a:lstStyle/>
+          <a:p>
+            <a:r>
+              <a:rPr lang="es-ES" dirty="0"/>
+              <a:t>Diseño e implementación de un servicio de acceso inalámbrico a dispositivos médicos mediante Heart-to-Heart</a:t>
+            </a:r>
           </a:p>
         </p:txBody>
       </p:sp>
@@ -7543,7 +7424,7 @@
               <a:pPr/>
               <a:t>11</a:t>
             </a:fld>
-            <a:endParaRPr lang="es-ES"/>
+            <a:endParaRPr lang="es-ES" dirty="0"/>
           </a:p>
         </p:txBody>
       </p:sp>
@@ -7655,25 +7536,16 @@
           <a:p>
             <a:pPr lvl="1"/>
             <a:r>
-              <a:rPr lang="es-ES" dirty="0" err="1"/>
-              <a:t>Deteccion</a:t>
-            </a:r>
-            <a:r>
-              <a:rPr lang="es-ES" dirty="0"/>
-              <a:t> de complejo QRS</a:t>
+              <a:rPr lang="es-ES" dirty="0"/>
+              <a:t>Detección de complejo QRS</a:t>
             </a:r>
           </a:p>
           <a:p>
             <a:pPr lvl="1"/>
             <a:r>
               <a:rPr lang="es-ES" dirty="0"/>
-              <a:t>Calculo de umbrales </a:t>
-            </a:r>
-            <a:r>
-              <a:rPr lang="es-ES" dirty="0" err="1"/>
-              <a:t>dinamicos</a:t>
-            </a:r>
-            <a:endParaRPr lang="es-ES" dirty="0"/>
+              <a:t>Calculo de umbrales dinámicos</a:t>
+            </a:r>
           </a:p>
         </p:txBody>
       </p:sp>
@@ -7695,9 +7567,9 @@
             <a:fld id="{51AD4A2B-43D8-42D4-921F-CEC9421467EC}" type="datetime1">
               <a:rPr lang="es-ES" smtClean="0"/>
               <a:pPr/>
-              <a:t>26/09/2016</a:t>
+              <a:t>27/09/2016</a:t>
             </a:fld>
-            <a:endParaRPr lang="es-ES"/>
+            <a:endParaRPr lang="es-ES" dirty="0"/>
           </a:p>
         </p:txBody>
       </p:sp>
@@ -7711,16 +7583,20 @@
             <p:ph type="ftr" sz="quarter" idx="11"/>
           </p:nvPr>
         </p:nvSpPr>
-        <p:spPr/>
-        <p:txBody>
-          <a:bodyPr/>
-          <a:lstStyle/>
-          <a:p>
-            <a:r>
-              <a:rPr lang="en-US"/>
-              <a:t>Cognitive based strategies for security in Wireless Sensor Networks</a:t>
-            </a:r>
-            <a:endParaRPr lang="es-ES"/>
+        <p:spPr>
+          <a:xfrm>
+            <a:off x="2801923" y="6492875"/>
+            <a:ext cx="5842043" cy="365125"/>
+          </a:xfrm>
+        </p:spPr>
+        <p:txBody>
+          <a:bodyPr/>
+          <a:lstStyle/>
+          <a:p>
+            <a:r>
+              <a:rPr lang="es-ES" dirty="0"/>
+              <a:t>Diseño e implementación de un servicio de acceso inalámbrico a dispositivos médicos mediante Heart-to-Heart</a:t>
+            </a:r>
           </a:p>
         </p:txBody>
       </p:sp>
@@ -7744,7 +7620,7 @@
               <a:pPr/>
               <a:t>12</a:t>
             </a:fld>
-            <a:endParaRPr lang="es-ES"/>
+            <a:endParaRPr lang="es-ES" dirty="0"/>
           </a:p>
         </p:txBody>
       </p:sp>
@@ -7832,12 +7708,8 @@
           <a:p>
             <a:pPr lvl="1"/>
             <a:r>
-              <a:rPr lang="es-ES" dirty="0" err="1"/>
-              <a:t>Multiplexacion</a:t>
-            </a:r>
-            <a:r>
-              <a:rPr lang="es-ES" dirty="0"/>
-              <a:t> de líneas físicas</a:t>
+              <a:rPr lang="es-ES" dirty="0"/>
+              <a:t>Multiplexacion de líneas físicas</a:t>
             </a:r>
           </a:p>
           <a:p>
@@ -7884,9 +7756,9 @@
             <a:fld id="{51AD4A2B-43D8-42D4-921F-CEC9421467EC}" type="datetime1">
               <a:rPr lang="es-ES" smtClean="0"/>
               <a:pPr/>
-              <a:t>26/09/2016</a:t>
+              <a:t>27/09/2016</a:t>
             </a:fld>
-            <a:endParaRPr lang="es-ES"/>
+            <a:endParaRPr lang="es-ES" dirty="0"/>
           </a:p>
         </p:txBody>
       </p:sp>
@@ -7900,16 +7772,20 @@
             <p:ph type="ftr" sz="quarter" idx="11"/>
           </p:nvPr>
         </p:nvSpPr>
-        <p:spPr/>
-        <p:txBody>
-          <a:bodyPr/>
-          <a:lstStyle/>
-          <a:p>
-            <a:r>
-              <a:rPr lang="en-US"/>
-              <a:t>Cognitive based strategies for security in Wireless Sensor Networks</a:t>
-            </a:r>
-            <a:endParaRPr lang="es-ES"/>
+        <p:spPr>
+          <a:xfrm>
+            <a:off x="2810312" y="6492875"/>
+            <a:ext cx="5833654" cy="365125"/>
+          </a:xfrm>
+        </p:spPr>
+        <p:txBody>
+          <a:bodyPr/>
+          <a:lstStyle/>
+          <a:p>
+            <a:r>
+              <a:rPr lang="es-ES" dirty="0"/>
+              <a:t>Diseño e implementación de un servicio de acceso inalámbrico a dispositivos médicos mediante Heart-to-Heart</a:t>
+            </a:r>
           </a:p>
         </p:txBody>
       </p:sp>
@@ -7933,7 +7809,7 @@
               <a:pPr/>
               <a:t>13</a:t>
             </a:fld>
-            <a:endParaRPr lang="es-ES"/>
+            <a:endParaRPr lang="es-ES" dirty="0"/>
           </a:p>
         </p:txBody>
       </p:sp>
@@ -8009,9 +7885,9 @@
             <a:fld id="{02A45F87-2D1C-4F7C-8EA3-844C7BDCBBFE}" type="datetime1">
               <a:rPr lang="es-ES" smtClean="0"/>
               <a:pPr/>
-              <a:t>26/09/2016</a:t>
+              <a:t>27/09/2016</a:t>
             </a:fld>
-            <a:endParaRPr lang="es-ES"/>
+            <a:endParaRPr lang="es-ES" dirty="0"/>
           </a:p>
         </p:txBody>
       </p:sp>
@@ -8062,7 +7938,7 @@
               <a:pPr/>
               <a:t>14</a:t>
             </a:fld>
-            <a:endParaRPr lang="es-ES"/>
+            <a:endParaRPr lang="es-ES" dirty="0"/>
           </a:p>
         </p:txBody>
       </p:sp>
@@ -8179,12 +8055,8 @@
               </a:lnSpc>
             </a:pPr>
             <a:r>
-              <a:rPr lang="es-ES" dirty="0" err="1"/>
-              <a:t>Informacion</a:t>
-            </a:r>
-            <a:r>
-              <a:rPr lang="es-ES" dirty="0"/>
-              <a:t> grafica a través de la pantalla</a:t>
+              <a:rPr lang="es-ES" dirty="0"/>
+              <a:t>Información grafica a través de la pantalla</a:t>
             </a:r>
           </a:p>
           <a:p>
@@ -8195,15 +8067,7 @@
             </a:pPr>
             <a:r>
               <a:rPr lang="es-ES" dirty="0"/>
-              <a:t>Entrada de comandos </a:t>
-            </a:r>
-            <a:r>
-              <a:rPr lang="es-ES" dirty="0" err="1"/>
-              <a:t>atraves</a:t>
-            </a:r>
-            <a:r>
-              <a:rPr lang="es-ES" dirty="0"/>
-              <a:t> de pantalla táctil</a:t>
+              <a:t>Entrada de comandos a través de pantalla táctil</a:t>
             </a:r>
           </a:p>
         </p:txBody>
@@ -8226,9 +8090,9 @@
             <a:fld id="{51AD4A2B-43D8-42D4-921F-CEC9421467EC}" type="datetime1">
               <a:rPr lang="es-ES" smtClean="0"/>
               <a:pPr/>
-              <a:t>26/09/2016</a:t>
+              <a:t>27/09/2016</a:t>
             </a:fld>
-            <a:endParaRPr lang="es-ES"/>
+            <a:endParaRPr lang="es-ES" dirty="0"/>
           </a:p>
         </p:txBody>
       </p:sp>
@@ -8242,16 +8106,20 @@
             <p:ph type="ftr" sz="quarter" idx="11"/>
           </p:nvPr>
         </p:nvSpPr>
-        <p:spPr/>
-        <p:txBody>
-          <a:bodyPr/>
-          <a:lstStyle/>
-          <a:p>
-            <a:r>
-              <a:rPr lang="en-US"/>
-              <a:t>Cognitive based strategies for security in Wireless Sensor Networks</a:t>
-            </a:r>
-            <a:endParaRPr lang="es-ES"/>
+        <p:spPr>
+          <a:xfrm>
+            <a:off x="2860646" y="6492875"/>
+            <a:ext cx="5783320" cy="365125"/>
+          </a:xfrm>
+        </p:spPr>
+        <p:txBody>
+          <a:bodyPr/>
+          <a:lstStyle/>
+          <a:p>
+            <a:r>
+              <a:rPr lang="es-ES" dirty="0"/>
+              <a:t>Diseño e implementación de un servicio de acceso inalámbrico a dispositivos médicos mediante Heart-to-Heart</a:t>
+            </a:r>
           </a:p>
         </p:txBody>
       </p:sp>
@@ -8275,7 +8143,7 @@
               <a:pPr/>
               <a:t>15</a:t>
             </a:fld>
-            <a:endParaRPr lang="es-ES"/>
+            <a:endParaRPr lang="es-ES" dirty="0"/>
           </a:p>
         </p:txBody>
       </p:sp>
@@ -8345,7 +8213,9 @@
         </p:nvSpPr>
         <p:spPr/>
         <p:txBody>
-          <a:bodyPr/>
+          <a:bodyPr>
+            <a:normAutofit fontScale="92500" lnSpcReduction="20000"/>
+          </a:bodyPr>
           <a:lstStyle/>
           <a:p>
             <a:r>
@@ -8360,12 +8230,41 @@
               </a:lnSpc>
             </a:pPr>
             <a:r>
-              <a:rPr lang="es-ES" dirty="0" err="1"/>
-              <a:t>Definicion</a:t>
-            </a:r>
-            <a:r>
-              <a:rPr lang="es-ES" dirty="0"/>
-              <a:t> de tareas</a:t>
+              <a:rPr lang="es-ES" dirty="0"/>
+              <a:t>Definición de tareas</a:t>
+            </a:r>
+          </a:p>
+          <a:p>
+            <a:pPr lvl="2">
+              <a:lnSpc>
+                <a:spcPct val="150000"/>
+              </a:lnSpc>
+            </a:pPr>
+            <a:r>
+              <a:rPr lang="es-ES" dirty="0"/>
+              <a:t>Tareas de señal</a:t>
+            </a:r>
+          </a:p>
+          <a:p>
+            <a:pPr lvl="2">
+              <a:lnSpc>
+                <a:spcPct val="150000"/>
+              </a:lnSpc>
+            </a:pPr>
+            <a:r>
+              <a:rPr lang="es-ES" dirty="0"/>
+              <a:t>Tareas de comunicación inalámbrica</a:t>
+            </a:r>
+          </a:p>
+          <a:p>
+            <a:pPr lvl="2">
+              <a:lnSpc>
+                <a:spcPct val="150000"/>
+              </a:lnSpc>
+            </a:pPr>
+            <a:r>
+              <a:rPr lang="es-ES" dirty="0"/>
+              <a:t>Tareas interfaz de usuario</a:t>
             </a:r>
           </a:p>
           <a:p>
@@ -8376,15 +8275,22 @@
             </a:pPr>
             <a:r>
               <a:rPr lang="es-ES" dirty="0"/>
-              <a:t>Sincronización entre </a:t>
-            </a:r>
-            <a:r>
-              <a:rPr lang="es-ES" dirty="0" err="1"/>
-              <a:t>modulos</a:t>
-            </a:r>
-            <a:r>
-              <a:rPr lang="es-ES" dirty="0"/>
-              <a:t> hardware y aplicación</a:t>
+              <a:t>Sincronización entre módulos hardware y tareas</a:t>
+            </a:r>
+          </a:p>
+          <a:p>
+            <a:pPr marL="324000" lvl="1" indent="0">
+              <a:lnSpc>
+                <a:spcPct val="150000"/>
+              </a:lnSpc>
+              <a:buNone/>
+            </a:pPr>
+            <a:endParaRPr lang="es-ES" dirty="0"/>
+          </a:p>
+          <a:p>
+            <a:r>
+              <a:rPr lang="es-ES" dirty="0"/>
+              <a:t>Control de consumo</a:t>
             </a:r>
           </a:p>
           <a:p>
@@ -8394,24 +8300,8 @@
               </a:lnSpc>
             </a:pPr>
             <a:r>
-              <a:rPr lang="es-ES" dirty="0" err="1"/>
-              <a:t>Sincronizacion</a:t>
-            </a:r>
-            <a:r>
-              <a:rPr lang="es-ES" dirty="0"/>
-              <a:t> de tareas</a:t>
-            </a:r>
-          </a:p>
-          <a:p>
-            <a:pPr marL="0" indent="0">
-              <a:buNone/>
-            </a:pPr>
-            <a:endParaRPr lang="es-ES" dirty="0"/>
-          </a:p>
-          <a:p>
-            <a:r>
-              <a:rPr lang="es-ES" dirty="0"/>
-              <a:t>Control de consumo</a:t>
+              <a:rPr lang="es-ES" dirty="0"/>
+              <a:t>Apagado por software</a:t>
             </a:r>
           </a:p>
           <a:p>
@@ -8422,22 +8312,7 @@
             </a:pPr>
             <a:r>
               <a:rPr lang="es-ES" dirty="0"/>
-              <a:t>Apagado por software</a:t>
-            </a:r>
-          </a:p>
-          <a:p>
-            <a:pPr lvl="1">
-              <a:lnSpc>
-                <a:spcPct val="150000"/>
-              </a:lnSpc>
-            </a:pPr>
-            <a:r>
-              <a:rPr lang="es-ES" dirty="0" err="1"/>
-              <a:t>Reduccion</a:t>
-            </a:r>
-            <a:r>
-              <a:rPr lang="es-ES" dirty="0"/>
-              <a:t> de consumo de pantalla</a:t>
+              <a:t>Reducción de consumo de pantalla</a:t>
             </a:r>
           </a:p>
         </p:txBody>
@@ -8460,9 +8335,9 @@
             <a:fld id="{51AD4A2B-43D8-42D4-921F-CEC9421467EC}" type="datetime1">
               <a:rPr lang="es-ES" smtClean="0"/>
               <a:pPr/>
-              <a:t>26/09/2016</a:t>
+              <a:t>27/09/2016</a:t>
             </a:fld>
-            <a:endParaRPr lang="es-ES"/>
+            <a:endParaRPr lang="es-ES" dirty="0"/>
           </a:p>
         </p:txBody>
       </p:sp>
@@ -8476,16 +8351,20 @@
             <p:ph type="ftr" sz="quarter" idx="11"/>
           </p:nvPr>
         </p:nvSpPr>
-        <p:spPr/>
-        <p:txBody>
-          <a:bodyPr/>
-          <a:lstStyle/>
-          <a:p>
-            <a:r>
-              <a:rPr lang="en-US"/>
-              <a:t>Cognitive based strategies for security in Wireless Sensor Networks</a:t>
-            </a:r>
-            <a:endParaRPr lang="es-ES"/>
+        <p:spPr>
+          <a:xfrm>
+            <a:off x="2793534" y="6492875"/>
+            <a:ext cx="5850432" cy="365125"/>
+          </a:xfrm>
+        </p:spPr>
+        <p:txBody>
+          <a:bodyPr/>
+          <a:lstStyle/>
+          <a:p>
+            <a:r>
+              <a:rPr lang="es-ES" dirty="0"/>
+              <a:t>Diseño e implementación de un servicio de acceso inalámbrico a dispositivos médicos mediante Heart-to-Heart</a:t>
+            </a:r>
           </a:p>
         </p:txBody>
       </p:sp>
@@ -8509,7 +8388,7 @@
               <a:pPr/>
               <a:t>16</a:t>
             </a:fld>
-            <a:endParaRPr lang="es-ES"/>
+            <a:endParaRPr lang="es-ES" dirty="0"/>
           </a:p>
         </p:txBody>
       </p:sp>
@@ -8579,7 +8458,9 @@
         </p:nvSpPr>
         <p:spPr/>
         <p:txBody>
-          <a:bodyPr/>
+          <a:bodyPr>
+            <a:normAutofit/>
+          </a:bodyPr>
           <a:lstStyle/>
           <a:p>
             <a:r>
@@ -8621,23 +8502,17 @@
             </a:r>
           </a:p>
           <a:p>
-            <a:endParaRPr lang="es-ES" dirty="0"/>
-          </a:p>
-          <a:p>
-            <a:r>
-              <a:rPr lang="es-ES" dirty="0"/>
-              <a:t>Interfaz de usuario</a:t>
-            </a:r>
-          </a:p>
-          <a:p>
             <a:pPr lvl="1">
               <a:lnSpc>
                 <a:spcPct val="150000"/>
               </a:lnSpc>
             </a:pPr>
-            <a:r>
-              <a:rPr lang="es-ES" dirty="0"/>
-              <a:t>Maquina de estados finitos</a:t>
+            <a:endParaRPr lang="es-ES" dirty="0"/>
+          </a:p>
+          <a:p>
+            <a:r>
+              <a:rPr lang="es-ES" dirty="0"/>
+              <a:t>Sistema operativo</a:t>
             </a:r>
           </a:p>
           <a:p>
@@ -8648,8 +8523,11 @@
             </a:pPr>
             <a:r>
               <a:rPr lang="es-ES" dirty="0"/>
-              <a:t>Interacción con los módulos hardware</a:t>
-            </a:r>
+              <a:t>Modelo productor-consumidor</a:t>
+            </a:r>
+          </a:p>
+          <a:p>
+            <a:endParaRPr lang="es-ES" dirty="0"/>
           </a:p>
           <a:p>
             <a:endParaRPr lang="es-ES" dirty="0"/>
@@ -8674,9 +8552,9 @@
             <a:fld id="{51AD4A2B-43D8-42D4-921F-CEC9421467EC}" type="datetime1">
               <a:rPr lang="es-ES" smtClean="0"/>
               <a:pPr/>
-              <a:t>26/09/2016</a:t>
+              <a:t>27/09/2016</a:t>
             </a:fld>
-            <a:endParaRPr lang="es-ES"/>
+            <a:endParaRPr lang="es-ES" dirty="0"/>
           </a:p>
         </p:txBody>
       </p:sp>
@@ -8690,16 +8568,20 @@
             <p:ph type="ftr" sz="quarter" idx="11"/>
           </p:nvPr>
         </p:nvSpPr>
-        <p:spPr/>
-        <p:txBody>
-          <a:bodyPr/>
-          <a:lstStyle/>
-          <a:p>
-            <a:r>
-              <a:rPr lang="en-US"/>
-              <a:t>Cognitive based strategies for security in Wireless Sensor Networks</a:t>
-            </a:r>
-            <a:endParaRPr lang="es-ES"/>
+        <p:spPr>
+          <a:xfrm>
+            <a:off x="2852257" y="6492875"/>
+            <a:ext cx="5791709" cy="365125"/>
+          </a:xfrm>
+        </p:spPr>
+        <p:txBody>
+          <a:bodyPr/>
+          <a:lstStyle/>
+          <a:p>
+            <a:r>
+              <a:rPr lang="es-ES" dirty="0"/>
+              <a:t>Diseño e implementación de un servicio de acceso inalámbrico a dispositivos médicos mediante Heart-to-Heart</a:t>
+            </a:r>
           </a:p>
         </p:txBody>
       </p:sp>
@@ -8723,7 +8605,7 @@
               <a:pPr/>
               <a:t>17</a:t>
             </a:fld>
-            <a:endParaRPr lang="es-ES"/>
+            <a:endParaRPr lang="es-ES" dirty="0"/>
           </a:p>
         </p:txBody>
       </p:sp>
@@ -8793,12 +8675,14 @@
         </p:nvSpPr>
         <p:spPr/>
         <p:txBody>
-          <a:bodyPr/>
-          <a:lstStyle/>
-          <a:p>
-            <a:r>
-              <a:rPr lang="es-ES" dirty="0"/>
-              <a:t>Sistema operativo</a:t>
+          <a:bodyPr>
+            <a:normAutofit/>
+          </a:bodyPr>
+          <a:lstStyle/>
+          <a:p>
+            <a:r>
+              <a:rPr lang="es-ES" dirty="0"/>
+              <a:t>Interfaz de usuario</a:t>
             </a:r>
           </a:p>
           <a:p>
@@ -8809,7 +8693,40 @@
             </a:pPr>
             <a:r>
               <a:rPr lang="es-ES" dirty="0"/>
-              <a:t>Modelo productor-consumidor</a:t>
+              <a:t>Maquina de estados finitos</a:t>
+            </a:r>
+          </a:p>
+          <a:p>
+            <a:pPr lvl="2">
+              <a:lnSpc>
+                <a:spcPct val="150000"/>
+              </a:lnSpc>
+            </a:pPr>
+            <a:r>
+              <a:rPr lang="es-ES" dirty="0"/>
+              <a:t>Menú ECG</a:t>
+            </a:r>
+          </a:p>
+          <a:p>
+            <a:pPr lvl="2">
+              <a:lnSpc>
+                <a:spcPct val="150000"/>
+              </a:lnSpc>
+            </a:pPr>
+            <a:r>
+              <a:rPr lang="es-ES" dirty="0"/>
+              <a:t>Menú H2H</a:t>
+            </a:r>
+          </a:p>
+          <a:p>
+            <a:pPr lvl="2">
+              <a:lnSpc>
+                <a:spcPct val="150000"/>
+              </a:lnSpc>
+            </a:pPr>
+            <a:r>
+              <a:rPr lang="es-ES" dirty="0"/>
+              <a:t>Menú configuración</a:t>
             </a:r>
           </a:p>
           <a:p>
@@ -8820,50 +8737,21 @@
             </a:pPr>
             <a:r>
               <a:rPr lang="es-ES" dirty="0"/>
-              <a:t>Tareas de señal</a:t>
-            </a:r>
-          </a:p>
-          <a:p>
-            <a:pPr lvl="1">
-              <a:lnSpc>
-                <a:spcPct val="150000"/>
-              </a:lnSpc>
-            </a:pPr>
-            <a:r>
-              <a:rPr lang="es-ES" dirty="0"/>
-              <a:t>Tareas de comunicación inalámbrica</a:t>
-            </a:r>
-          </a:p>
-          <a:p>
-            <a:pPr lvl="1">
-              <a:lnSpc>
-                <a:spcPct val="150000"/>
-              </a:lnSpc>
-            </a:pPr>
-            <a:r>
-              <a:rPr lang="es-ES" dirty="0"/>
-              <a:t>Tareas interfaz de usuario</a:t>
-            </a:r>
-          </a:p>
-          <a:p>
-            <a:pPr lvl="1"/>
-            <a:endParaRPr lang="es-ES" dirty="0"/>
-          </a:p>
-          <a:p>
-            <a:r>
-              <a:rPr lang="es-ES" dirty="0"/>
-              <a:t>Control de consumo</a:t>
-            </a:r>
-          </a:p>
-          <a:p>
-            <a:pPr lvl="1">
-              <a:lnSpc>
-                <a:spcPct val="150000"/>
-              </a:lnSpc>
-            </a:pPr>
-            <a:r>
-              <a:rPr lang="es-ES" dirty="0"/>
-              <a:t>Pulsador hardware</a:t>
+              <a:t>Interacción con los módulos hardware</a:t>
+            </a:r>
+          </a:p>
+          <a:p>
+            <a:pPr lvl="2"/>
+            <a:r>
+              <a:rPr lang="es-ES" dirty="0"/>
+              <a:t>Pulsador hardware (Control de consumo)</a:t>
+            </a:r>
+          </a:p>
+          <a:p>
+            <a:pPr lvl="2"/>
+            <a:r>
+              <a:rPr lang="es-ES" dirty="0"/>
+              <a:t>Batería y hora. </a:t>
             </a:r>
           </a:p>
         </p:txBody>
@@ -8886,9 +8774,9 @@
             <a:fld id="{51AD4A2B-43D8-42D4-921F-CEC9421467EC}" type="datetime1">
               <a:rPr lang="es-ES" smtClean="0"/>
               <a:pPr/>
-              <a:t>26/09/2016</a:t>
+              <a:t>27/09/2016</a:t>
             </a:fld>
-            <a:endParaRPr lang="es-ES"/>
+            <a:endParaRPr lang="es-ES" dirty="0"/>
           </a:p>
         </p:txBody>
       </p:sp>
@@ -8939,7 +8827,7 @@
               <a:pPr/>
               <a:t>18</a:t>
             </a:fld>
-            <a:endParaRPr lang="es-ES"/>
+            <a:endParaRPr lang="es-ES" dirty="0"/>
           </a:p>
         </p:txBody>
       </p:sp>
@@ -9015,9 +8903,9 @@
             <a:fld id="{02A45F87-2D1C-4F7C-8EA3-844C7BDCBBFE}" type="datetime1">
               <a:rPr lang="es-ES" smtClean="0"/>
               <a:pPr/>
-              <a:t>26/09/2016</a:t>
+              <a:t>27/09/2016</a:t>
             </a:fld>
-            <a:endParaRPr lang="es-ES"/>
+            <a:endParaRPr lang="es-ES" dirty="0"/>
           </a:p>
         </p:txBody>
       </p:sp>
@@ -9068,7 +8956,7 @@
               <a:pPr/>
               <a:t>19</a:t>
             </a:fld>
-            <a:endParaRPr lang="es-ES"/>
+            <a:endParaRPr lang="es-ES" dirty="0"/>
           </a:p>
         </p:txBody>
       </p:sp>
@@ -9144,9 +9032,9 @@
             <a:fld id="{72547699-2E61-4413-A3FF-6F5A877B8862}" type="datetime1">
               <a:rPr lang="es-ES" smtClean="0"/>
               <a:pPr/>
-              <a:t>26/09/2016</a:t>
+              <a:t>27/09/2016</a:t>
             </a:fld>
-            <a:endParaRPr lang="es-ES"/>
+            <a:endParaRPr lang="es-ES" dirty="0"/>
           </a:p>
         </p:txBody>
       </p:sp>
@@ -9167,13 +9055,8 @@
           <a:p>
             <a:r>
               <a:rPr lang="es-ES" dirty="0"/>
-              <a:t>Diseño e implementación de un servicio de acceso inalámbrico a dispositivos médicos mediante Heart-to-</a:t>
-            </a:r>
-            <a:r>
-              <a:rPr lang="es-ES" dirty="0" err="1"/>
-              <a:t>Hear</a:t>
-            </a:r>
-            <a:endParaRPr lang="es-ES" dirty="0"/>
+              <a:t>Diseño e implementación de un servicio de acceso inalámbrico a dispositivos médicos mediante Heart-to-Heart</a:t>
+            </a:r>
           </a:p>
         </p:txBody>
       </p:sp>
@@ -9197,7 +9080,7 @@
               <a:pPr/>
               <a:t>2</a:t>
             </a:fld>
-            <a:endParaRPr lang="es-ES"/>
+            <a:endParaRPr lang="es-ES" dirty="0"/>
           </a:p>
         </p:txBody>
       </p:sp>
@@ -9250,14 +9133,11 @@
           <a:p>
             <a:r>
               <a:rPr lang="es-ES" dirty="0"/>
-              <a:t>Conclusiones</a:t>
-            </a:r>
-          </a:p>
-          <a:p>
-            <a:r>
-              <a:rPr lang="es-ES" dirty="0"/>
-              <a:t>Líneas futuras</a:t>
-            </a:r>
+              <a:t>Conclusiones y Líneas futuras</a:t>
+            </a:r>
+          </a:p>
+          <a:p>
+            <a:endParaRPr lang="es-ES" dirty="0"/>
           </a:p>
           <a:p>
             <a:endParaRPr lang="es-ES" dirty="0"/>
@@ -9335,15 +9215,7 @@
           <a:p>
             <a:r>
               <a:rPr lang="es-ES" dirty="0"/>
-              <a:t>Pruebas del algoritmo de detección de </a:t>
-            </a:r>
-            <a:r>
-              <a:rPr lang="es-ES" dirty="0" err="1"/>
-              <a:t>rimto</a:t>
-            </a:r>
-            <a:r>
-              <a:rPr lang="es-ES" dirty="0"/>
-              <a:t> cardiaco</a:t>
+              <a:t>Pruebas del algoritmo de detección de ritmo cardiaco</a:t>
             </a:r>
           </a:p>
           <a:p>
@@ -9356,12 +9228,8 @@
           <a:p>
             <a:pPr lvl="1"/>
             <a:r>
-              <a:rPr lang="es-ES" dirty="0" err="1"/>
-              <a:t>Desviacion</a:t>
-            </a:r>
-            <a:r>
-              <a:rPr lang="es-ES" dirty="0"/>
-              <a:t> del ritmo cardiaco real</a:t>
+              <a:rPr lang="es-ES" dirty="0"/>
+              <a:t>Desviación del ritmo cardiaco real</a:t>
             </a:r>
           </a:p>
           <a:p>
@@ -9408,9 +9276,9 @@
             <a:fld id="{51AD4A2B-43D8-42D4-921F-CEC9421467EC}" type="datetime1">
               <a:rPr lang="es-ES" smtClean="0"/>
               <a:pPr/>
-              <a:t>26/09/2016</a:t>
+              <a:t>27/09/2016</a:t>
             </a:fld>
-            <a:endParaRPr lang="es-ES"/>
+            <a:endParaRPr lang="es-ES" dirty="0"/>
           </a:p>
         </p:txBody>
       </p:sp>
@@ -9461,7 +9329,7 @@
               <a:pPr/>
               <a:t>20</a:t>
             </a:fld>
-            <a:endParaRPr lang="es-ES"/>
+            <a:endParaRPr lang="es-ES" dirty="0"/>
           </a:p>
         </p:txBody>
       </p:sp>
@@ -9508,13 +9376,13 @@
         <p:spPr/>
         <p:txBody>
           <a:bodyPr>
-            <a:normAutofit/>
+            <a:normAutofit fontScale="90000"/>
           </a:bodyPr>
           <a:lstStyle/>
           <a:p>
             <a:r>
               <a:rPr lang="es-ES" dirty="0"/>
-              <a:t>CONCLUSIONES</a:t>
+              <a:t>CONCLUSIONES Y LINEAS FUTURAS</a:t>
             </a:r>
           </a:p>
         </p:txBody>
@@ -9537,9 +9405,9 @@
             <a:fld id="{02A45F87-2D1C-4F7C-8EA3-844C7BDCBBFE}" type="datetime1">
               <a:rPr lang="es-ES" smtClean="0"/>
               <a:pPr/>
-              <a:t>26/09/2016</a:t>
+              <a:t>27/09/2016</a:t>
             </a:fld>
-            <a:endParaRPr lang="es-ES"/>
+            <a:endParaRPr lang="es-ES" dirty="0"/>
           </a:p>
         </p:txBody>
       </p:sp>
@@ -9590,7 +9458,7 @@
               <a:pPr/>
               <a:t>21</a:t>
             </a:fld>
-            <a:endParaRPr lang="es-ES"/>
+            <a:endParaRPr lang="es-ES" dirty="0"/>
           </a:p>
         </p:txBody>
       </p:sp>
@@ -9742,9 +9610,9 @@
             <a:fld id="{51AD4A2B-43D8-42D4-921F-CEC9421467EC}" type="datetime1">
               <a:rPr lang="es-ES" smtClean="0"/>
               <a:pPr/>
-              <a:t>26/09/2016</a:t>
+              <a:t>27/09/2016</a:t>
             </a:fld>
-            <a:endParaRPr lang="es-ES"/>
+            <a:endParaRPr lang="es-ES" dirty="0"/>
           </a:p>
         </p:txBody>
       </p:sp>
@@ -9795,7 +9663,7 @@
               <a:pPr/>
               <a:t>22</a:t>
             </a:fld>
-            <a:endParaRPr lang="es-ES"/>
+            <a:endParaRPr lang="es-ES" dirty="0"/>
           </a:p>
         </p:txBody>
       </p:sp>
@@ -9975,7 +9843,7 @@
       </p:grpSpPr>
       <p:sp>
         <p:nvSpPr>
-          <p:cNvPr id="2" name="Title 1"/>
+          <p:cNvPr id="2" name="Título 1"/>
           <p:cNvSpPr>
             <a:spLocks noGrp="1"/>
           </p:cNvSpPr>
@@ -9999,7 +9867,50 @@
       </p:sp>
       <p:sp>
         <p:nvSpPr>
-          <p:cNvPr id="3" name="Date Placeholder 2"/>
+          <p:cNvPr id="3" name="Marcador de contenido 2"/>
+          <p:cNvSpPr>
+            <a:spLocks noGrp="1"/>
+          </p:cNvSpPr>
+          <p:nvPr>
+            <p:ph idx="1"/>
+          </p:nvPr>
+        </p:nvSpPr>
+        <p:spPr/>
+        <p:txBody>
+          <a:bodyPr/>
+          <a:lstStyle/>
+          <a:p>
+            <a:endParaRPr lang="es-ES" dirty="0"/>
+          </a:p>
+          <a:p>
+            <a:r>
+              <a:rPr lang="es-ES" dirty="0"/>
+              <a:t>Optimización del uso de RAM</a:t>
+            </a:r>
+          </a:p>
+          <a:p>
+            <a:r>
+              <a:rPr lang="es-ES" dirty="0"/>
+              <a:t>Implementación de una capa de encriptación de datos para la comunicación inalámbrica</a:t>
+            </a:r>
+          </a:p>
+          <a:p>
+            <a:r>
+              <a:rPr lang="es-ES" dirty="0"/>
+              <a:t>Detección automática situaciones de riesgo cardiaco </a:t>
+            </a:r>
+          </a:p>
+          <a:p>
+            <a:r>
+              <a:rPr lang="es-ES" dirty="0"/>
+              <a:t>Ayuda al diagnostico</a:t>
+            </a:r>
+          </a:p>
+        </p:txBody>
+      </p:sp>
+      <p:sp>
+        <p:nvSpPr>
+          <p:cNvPr id="4" name="Marcador de fecha 3"/>
           <p:cNvSpPr>
             <a:spLocks noGrp="1"/>
           </p:cNvSpPr>
@@ -10012,18 +9923,18 @@
           <a:bodyPr/>
           <a:lstStyle/>
           <a:p>
-            <a:fld id="{02A45F87-2D1C-4F7C-8EA3-844C7BDCBBFE}" type="datetime1">
+            <a:fld id="{51AD4A2B-43D8-42D4-921F-CEC9421467EC}" type="datetime1">
               <a:rPr lang="es-ES" smtClean="0"/>
               <a:pPr/>
-              <a:t>26/09/2016</a:t>
+              <a:t>27/09/2016</a:t>
             </a:fld>
-            <a:endParaRPr lang="es-ES"/>
-          </a:p>
-        </p:txBody>
-      </p:sp>
-      <p:sp>
-        <p:nvSpPr>
-          <p:cNvPr id="4" name="Footer Placeholder 3"/>
+            <a:endParaRPr lang="es-ES" dirty="0"/>
+          </a:p>
+        </p:txBody>
+      </p:sp>
+      <p:sp>
+        <p:nvSpPr>
+          <p:cNvPr id="5" name="Marcador de pie de página 4"/>
           <p:cNvSpPr>
             <a:spLocks noGrp="1"/>
           </p:cNvSpPr>
@@ -10033,8 +9944,8 @@
         </p:nvSpPr>
         <p:spPr>
           <a:xfrm>
-            <a:off x="2810313" y="6492875"/>
-            <a:ext cx="5833654" cy="365125"/>
+            <a:off x="2818701" y="6492875"/>
+            <a:ext cx="5825265" cy="365125"/>
           </a:xfrm>
         </p:spPr>
         <p:txBody>
@@ -10050,7 +9961,7 @@
       </p:sp>
       <p:sp>
         <p:nvSpPr>
-          <p:cNvPr id="5" name="Slide Number Placeholder 4"/>
+          <p:cNvPr id="6" name="Marcador de número de diapositiva 5"/>
           <p:cNvSpPr>
             <a:spLocks noGrp="1"/>
           </p:cNvSpPr>
@@ -10068,14 +9979,14 @@
               <a:pPr/>
               <a:t>23</a:t>
             </a:fld>
-            <a:endParaRPr lang="es-ES"/>
+            <a:endParaRPr lang="es-ES" dirty="0"/>
           </a:p>
         </p:txBody>
       </p:sp>
     </p:spTree>
     <p:extLst>
       <p:ext uri="{BB962C8B-B14F-4D97-AF65-F5344CB8AC3E}">
-        <p14:creationId xmlns:p14="http://schemas.microsoft.com/office/powerpoint/2010/main" val="849950863"/>
+        <p14:creationId xmlns:p14="http://schemas.microsoft.com/office/powerpoint/2010/main" val="3637361172"/>
       </p:ext>
     </p:extLst>
   </p:cSld>
@@ -10114,178 +10025,6 @@
         </p:nvSpPr>
         <p:spPr/>
         <p:txBody>
-          <a:bodyPr>
-            <a:normAutofit/>
-          </a:bodyPr>
-          <a:lstStyle/>
-          <a:p>
-            <a:r>
-              <a:rPr lang="es-ES" dirty="0"/>
-              <a:t>LINEAS FUTURAS</a:t>
-            </a:r>
-          </a:p>
-        </p:txBody>
-      </p:sp>
-      <p:sp>
-        <p:nvSpPr>
-          <p:cNvPr id="3" name="Marcador de contenido 2"/>
-          <p:cNvSpPr>
-            <a:spLocks noGrp="1"/>
-          </p:cNvSpPr>
-          <p:nvPr>
-            <p:ph idx="1"/>
-          </p:nvPr>
-        </p:nvSpPr>
-        <p:spPr/>
-        <p:txBody>
-          <a:bodyPr/>
-          <a:lstStyle/>
-          <a:p>
-            <a:endParaRPr lang="es-ES" dirty="0"/>
-          </a:p>
-          <a:p>
-            <a:r>
-              <a:rPr lang="es-ES" dirty="0"/>
-              <a:t>Optimización del uso de RAM</a:t>
-            </a:r>
-          </a:p>
-          <a:p>
-            <a:r>
-              <a:rPr lang="es-ES" dirty="0"/>
-              <a:t>Implementación de una capa de encriptación de datos para la comunicación inalámbrica</a:t>
-            </a:r>
-          </a:p>
-          <a:p>
-            <a:r>
-              <a:rPr lang="es-ES" dirty="0"/>
-              <a:t>Detección automática situaciones de riesgo cardiaco </a:t>
-            </a:r>
-          </a:p>
-          <a:p>
-            <a:r>
-              <a:rPr lang="es-ES" dirty="0"/>
-              <a:t>Ayuda al diagnostico</a:t>
-            </a:r>
-          </a:p>
-        </p:txBody>
-      </p:sp>
-      <p:sp>
-        <p:nvSpPr>
-          <p:cNvPr id="4" name="Marcador de fecha 3"/>
-          <p:cNvSpPr>
-            <a:spLocks noGrp="1"/>
-          </p:cNvSpPr>
-          <p:nvPr>
-            <p:ph type="dt" sz="half" idx="10"/>
-          </p:nvPr>
-        </p:nvSpPr>
-        <p:spPr/>
-        <p:txBody>
-          <a:bodyPr/>
-          <a:lstStyle/>
-          <a:p>
-            <a:fld id="{51AD4A2B-43D8-42D4-921F-CEC9421467EC}" type="datetime1">
-              <a:rPr lang="es-ES" smtClean="0"/>
-              <a:pPr/>
-              <a:t>26/09/2016</a:t>
-            </a:fld>
-            <a:endParaRPr lang="es-ES"/>
-          </a:p>
-        </p:txBody>
-      </p:sp>
-      <p:sp>
-        <p:nvSpPr>
-          <p:cNvPr id="5" name="Marcador de pie de página 4"/>
-          <p:cNvSpPr>
-            <a:spLocks noGrp="1"/>
-          </p:cNvSpPr>
-          <p:nvPr>
-            <p:ph type="ftr" sz="quarter" idx="11"/>
-          </p:nvPr>
-        </p:nvSpPr>
-        <p:spPr>
-          <a:xfrm>
-            <a:off x="2818701" y="6492875"/>
-            <a:ext cx="5825265" cy="365125"/>
-          </a:xfrm>
-        </p:spPr>
-        <p:txBody>
-          <a:bodyPr/>
-          <a:lstStyle/>
-          <a:p>
-            <a:r>
-              <a:rPr lang="es-ES" dirty="0"/>
-              <a:t>Diseño e implementación de un servicio de acceso inalámbrico a dispositivos médicos mediante Heart-to-Heart</a:t>
-            </a:r>
-          </a:p>
-        </p:txBody>
-      </p:sp>
-      <p:sp>
-        <p:nvSpPr>
-          <p:cNvPr id="6" name="Marcador de número de diapositiva 5"/>
-          <p:cNvSpPr>
-            <a:spLocks noGrp="1"/>
-          </p:cNvSpPr>
-          <p:nvPr>
-            <p:ph type="sldNum" sz="quarter" idx="12"/>
-          </p:nvPr>
-        </p:nvSpPr>
-        <p:spPr/>
-        <p:txBody>
-          <a:bodyPr/>
-          <a:lstStyle/>
-          <a:p>
-            <a:fld id="{A259D134-71CD-43F6-A501-5E8BD6D3DFEE}" type="slidenum">
-              <a:rPr lang="es-ES" smtClean="0"/>
-              <a:pPr/>
-              <a:t>24</a:t>
-            </a:fld>
-            <a:endParaRPr lang="es-ES"/>
-          </a:p>
-        </p:txBody>
-      </p:sp>
-    </p:spTree>
-    <p:extLst>
-      <p:ext uri="{BB962C8B-B14F-4D97-AF65-F5344CB8AC3E}">
-        <p14:creationId xmlns:p14="http://schemas.microsoft.com/office/powerpoint/2010/main" val="3637361172"/>
-      </p:ext>
-    </p:extLst>
-  </p:cSld>
-  <p:clrMapOvr>
-    <a:masterClrMapping/>
-  </p:clrMapOvr>
-</p:sld>
-</file>
-
-<file path=ppt/slides/slide25.xml><?xml version="1.0" encoding="utf-8"?>
-<p:sld xmlns:a="http://schemas.openxmlformats.org/drawingml/2006/main" xmlns:r="http://schemas.openxmlformats.org/officeDocument/2006/relationships" xmlns:p="http://schemas.openxmlformats.org/presentationml/2006/main">
-  <p:cSld>
-    <p:spTree>
-      <p:nvGrpSpPr>
-        <p:cNvPr id="1" name=""/>
-        <p:cNvGrpSpPr/>
-        <p:nvPr/>
-      </p:nvGrpSpPr>
-      <p:grpSpPr>
-        <a:xfrm>
-          <a:off x="0" y="0"/>
-          <a:ext cx="0" cy="0"/>
-          <a:chOff x="0" y="0"/>
-          <a:chExt cx="0" cy="0"/>
-        </a:xfrm>
-      </p:grpSpPr>
-      <p:sp>
-        <p:nvSpPr>
-          <p:cNvPr id="2" name="Título 1"/>
-          <p:cNvSpPr>
-            <a:spLocks noGrp="1"/>
-          </p:cNvSpPr>
-          <p:nvPr>
-            <p:ph type="title"/>
-          </p:nvPr>
-        </p:nvSpPr>
-        <p:spPr/>
-        <p:txBody>
           <a:bodyPr/>
           <a:lstStyle/>
           <a:p>
@@ -10342,9 +10081,9 @@
             <a:fld id="{51AD4A2B-43D8-42D4-921F-CEC9421467EC}" type="datetime1">
               <a:rPr lang="es-ES" smtClean="0"/>
               <a:pPr/>
-              <a:t>26/09/2016</a:t>
+              <a:t>27/09/2016</a:t>
             </a:fld>
-            <a:endParaRPr lang="es-ES"/>
+            <a:endParaRPr lang="es-ES" dirty="0"/>
           </a:p>
         </p:txBody>
       </p:sp>
@@ -10388,9 +10127,9 @@
             <a:fld id="{A259D134-71CD-43F6-A501-5E8BD6D3DFEE}" type="slidenum">
               <a:rPr lang="es-ES" smtClean="0"/>
               <a:pPr/>
-              <a:t>25</a:t>
+              <a:t>24</a:t>
             </a:fld>
-            <a:endParaRPr lang="es-ES"/>
+            <a:endParaRPr lang="es-ES" dirty="0"/>
           </a:p>
         </p:txBody>
       </p:sp>
@@ -10464,9 +10203,9 @@
             <a:fld id="{02A45F87-2D1C-4F7C-8EA3-844C7BDCBBFE}" type="datetime1">
               <a:rPr lang="es-ES" smtClean="0"/>
               <a:pPr/>
-              <a:t>26/09/2016</a:t>
+              <a:t>27/09/2016</a:t>
             </a:fld>
-            <a:endParaRPr lang="es-ES"/>
+            <a:endParaRPr lang="es-ES" dirty="0"/>
           </a:p>
         </p:txBody>
       </p:sp>
@@ -10517,7 +10256,7 @@
               <a:pPr/>
               <a:t>3</a:t>
             </a:fld>
-            <a:endParaRPr lang="es-ES"/>
+            <a:endParaRPr lang="es-ES" dirty="0"/>
           </a:p>
         </p:txBody>
       </p:sp>
@@ -10591,7 +10330,7 @@
             <a:fld id="{5900E160-C635-4648-8A55-1D51BDEFBB2B}" type="datetime1">
               <a:rPr lang="es-ES" smtClean="0"/>
               <a:pPr/>
-              <a:t>26/09/2016</a:t>
+              <a:t>27/09/2016</a:t>
             </a:fld>
             <a:endParaRPr lang="es-ES" dirty="0"/>
           </a:p>
@@ -10644,7 +10383,7 @@
               <a:pPr/>
               <a:t>4</a:t>
             </a:fld>
-            <a:endParaRPr lang="es-ES"/>
+            <a:endParaRPr lang="es-ES" dirty="0"/>
           </a:p>
         </p:txBody>
       </p:sp>
@@ -10835,7 +10574,7 @@
             <a:fld id="{5900E160-C635-4648-8A55-1D51BDEFBB2B}" type="datetime1">
               <a:rPr lang="es-ES" smtClean="0"/>
               <a:pPr/>
-              <a:t>26/09/2016</a:t>
+              <a:t>27/09/2016</a:t>
             </a:fld>
             <a:endParaRPr lang="es-ES" dirty="0"/>
           </a:p>
@@ -10888,7 +10627,7 @@
               <a:pPr/>
               <a:t>5</a:t>
             </a:fld>
-            <a:endParaRPr lang="es-ES"/>
+            <a:endParaRPr lang="es-ES" dirty="0"/>
           </a:p>
         </p:txBody>
       </p:sp>
@@ -11034,21 +10773,8 @@
           <a:p>
             <a:r>
               <a:rPr lang="es-ES" dirty="0"/>
-              <a:t>Diseño e implementación de una plataforma hardware para un sistema de acceso inalámbrico a dispositivos médicos mediante </a:t>
-            </a:r>
-            <a:r>
-              <a:rPr lang="es-ES" dirty="0" err="1"/>
-              <a:t>Heart</a:t>
-            </a:r>
-            <a:r>
-              <a:rPr lang="es-ES" dirty="0"/>
-              <a:t>-To-</a:t>
-            </a:r>
-            <a:r>
-              <a:rPr lang="es-ES" dirty="0" err="1"/>
-              <a:t>Heart</a:t>
-            </a:r>
-            <a:endParaRPr lang="es-ES" dirty="0"/>
+              <a:t>Diseño e implementación de una plataforma hardware para un sistema de acceso inalámbrico a dispositivos médicos mediante Heart-To-Heart</a:t>
+            </a:r>
           </a:p>
         </p:txBody>
       </p:sp>
@@ -11072,7 +10798,7 @@
               <a:pPr/>
               <a:t>6</a:t>
             </a:fld>
-            <a:endParaRPr lang="es-ES"/>
+            <a:endParaRPr lang="es-ES" dirty="0"/>
           </a:p>
         </p:txBody>
       </p:sp>
@@ -11309,24 +11035,14 @@
           <a:p>
             <a:r>
               <a:rPr lang="es-ES" dirty="0"/>
-              <a:t>Algoritmo de </a:t>
-            </a:r>
-            <a:r>
-              <a:rPr lang="es-ES" dirty="0" err="1"/>
-              <a:t>autenticacion</a:t>
-            </a:r>
-            <a:endParaRPr lang="es-ES" dirty="0"/>
-          </a:p>
-          <a:p>
-            <a:r>
-              <a:rPr lang="es-ES" dirty="0"/>
-              <a:t>Comunicación </a:t>
-            </a:r>
-            <a:r>
-              <a:rPr lang="es-ES" dirty="0" err="1"/>
-              <a:t>inalambrica</a:t>
-            </a:r>
-            <a:endParaRPr lang="es-ES" dirty="0"/>
+              <a:t>Algoritmo de autenticación</a:t>
+            </a:r>
+          </a:p>
+          <a:p>
+            <a:r>
+              <a:rPr lang="es-ES" dirty="0"/>
+              <a:t>Comunicación inalámbrica</a:t>
+            </a:r>
           </a:p>
           <a:p>
             <a:r>
@@ -11408,9 +11124,9 @@
             <a:fld id="{02A45F87-2D1C-4F7C-8EA3-844C7BDCBBFE}" type="datetime1">
               <a:rPr lang="es-ES" smtClean="0"/>
               <a:pPr/>
-              <a:t>26/09/2016</a:t>
+              <a:t>27/09/2016</a:t>
             </a:fld>
-            <a:endParaRPr lang="es-ES"/>
+            <a:endParaRPr lang="es-ES" dirty="0"/>
           </a:p>
         </p:txBody>
       </p:sp>
@@ -11461,7 +11177,7 @@
               <a:pPr/>
               <a:t>7</a:t>
             </a:fld>
-            <a:endParaRPr lang="es-ES"/>
+            <a:endParaRPr lang="es-ES" dirty="0"/>
           </a:p>
         </p:txBody>
       </p:sp>
@@ -11535,7 +11251,7 @@
             <a:fld id="{5900E160-C635-4648-8A55-1D51BDEFBB2B}" type="datetime1">
               <a:rPr lang="es-ES" smtClean="0"/>
               <a:pPr/>
-              <a:t>26/09/2016</a:t>
+              <a:t>27/09/2016</a:t>
             </a:fld>
             <a:endParaRPr lang="es-ES" dirty="0"/>
           </a:p>
@@ -11588,7 +11304,7 @@
               <a:pPr/>
               <a:t>8</a:t>
             </a:fld>
-            <a:endParaRPr lang="es-ES"/>
+            <a:endParaRPr lang="es-ES" dirty="0"/>
           </a:p>
         </p:txBody>
       </p:sp>
@@ -11747,9 +11463,9 @@
             <a:fld id="{02A45F87-2D1C-4F7C-8EA3-844C7BDCBBFE}" type="datetime1">
               <a:rPr lang="es-ES" smtClean="0"/>
               <a:pPr/>
-              <a:t>26/09/2016</a:t>
+              <a:t>27/09/2016</a:t>
             </a:fld>
-            <a:endParaRPr lang="es-ES"/>
+            <a:endParaRPr lang="es-ES" dirty="0"/>
           </a:p>
         </p:txBody>
       </p:sp>
@@ -11800,7 +11516,7 @@
               <a:pPr/>
               <a:t>9</a:t>
             </a:fld>
-            <a:endParaRPr lang="es-ES"/>
+            <a:endParaRPr lang="es-ES" dirty="0"/>
           </a:p>
         </p:txBody>
       </p:sp>

</xml_diff>